<commit_message>
FIX: change lp_hpcinfo_training to lp_hpcinfo
</commit_message>
<xml_diff>
--- a/VSCintro-demo-slurm.pptx
+++ b/VSCintro-demo-slurm.pptx
@@ -6459,7 +6459,7 @@
                 </a:solidFill>
                 <a:ea typeface="新細明體" panose="02020500000000000000" pitchFamily="18" charset="-120"/>
               </a:rPr>
-              <a:t>lp_hpcinfo_training</a:t>
+              <a:t>lp_hpcinfo</a:t>
             </a:r>
             <a:r>
               <a:rPr lang="en-US" altLang="zh-TW" sz="2000" dirty="0" smtClean="0">
@@ -10852,7 +10852,7 @@
                 <a:hlinkClick r:id="rId2">
                   <a:extLst>
                     <a:ext uri="{A12FA001-AC4F-418D-AE19-62706E023703}">
-                      <ahyp:hlinkClr xmlns:ahyp="http://schemas.microsoft.com/office/drawing/2018/hyperlinkcolor" xmlns="" val="tx"/>
+                      <ahyp:hlinkClr xmlns="" xmlns:ahyp="http://schemas.microsoft.com/office/drawing/2018/hyperlinkcolor" val="tx"/>
                     </a:ext>
                   </a:extLst>
                 </a:hlinkClick>
@@ -10879,7 +10879,7 @@
                 <a:hlinkClick r:id="rId3">
                   <a:extLst>
                     <a:ext uri="{A12FA001-AC4F-418D-AE19-62706E023703}">
-                      <ahyp:hlinkClr xmlns:ahyp="http://schemas.microsoft.com/office/drawing/2018/hyperlinkcolor" xmlns="" val="tx"/>
+                      <ahyp:hlinkClr xmlns="" xmlns:ahyp="http://schemas.microsoft.com/office/drawing/2018/hyperlinkcolor" val="tx"/>
                     </a:ext>
                   </a:extLst>
                 </a:hlinkClick>
@@ -10915,7 +10915,7 @@
                 <a:hlinkClick r:id="rId4">
                   <a:extLst>
                     <a:ext uri="{A12FA001-AC4F-418D-AE19-62706E023703}">
-                      <ahyp:hlinkClr xmlns:ahyp="http://schemas.microsoft.com/office/drawing/2018/hyperlinkcolor" xmlns="" val="tx"/>
+                      <ahyp:hlinkClr xmlns="" xmlns:ahyp="http://schemas.microsoft.com/office/drawing/2018/hyperlinkcolor" val="tx"/>
                     </a:ext>
                   </a:extLst>
                 </a:hlinkClick>
@@ -10978,7 +10978,7 @@
                 <a:hlinkClick r:id="rId5">
                   <a:extLst>
                     <a:ext uri="{A12FA001-AC4F-418D-AE19-62706E023703}">
-                      <ahyp:hlinkClr xmlns:ahyp="http://schemas.microsoft.com/office/drawing/2018/hyperlinkcolor" xmlns="" val="tx"/>
+                      <ahyp:hlinkClr xmlns="" xmlns:ahyp="http://schemas.microsoft.com/office/drawing/2018/hyperlinkcolor" val="tx"/>
                     </a:ext>
                   </a:extLst>
                 </a:hlinkClick>
@@ -12035,6 +12035,64 @@
 </file>
 
 <file path=customXml/item1.xml><?xml version="1.0" encoding="utf-8"?>
+<?mso-contentType ?>
+<spe:Receivers xmlns:spe="http://schemas.microsoft.com/sharepoint/events">
+  <Receiver>
+    <Name>Document ID Generator</Name>
+    <Synchronization>Synchronous</Synchronization>
+    <Type>10001</Type>
+    <SequenceNumber>1000</SequenceNumber>
+    <Assembly>Microsoft.Office.DocumentManagement, Version=14.0.0.0, Culture=neutral, PublicKeyToken=71e9bce111e9429c</Assembly>
+    <Class>Microsoft.Office.DocumentManagement.Internal.DocIdHandler</Class>
+    <Data/>
+    <Filter/>
+  </Receiver>
+  <Receiver>
+    <Name>Document ID Generator</Name>
+    <Synchronization>Synchronous</Synchronization>
+    <Type>10002</Type>
+    <SequenceNumber>1001</SequenceNumber>
+    <Assembly>Microsoft.Office.DocumentManagement, Version=14.0.0.0, Culture=neutral, PublicKeyToken=71e9bce111e9429c</Assembly>
+    <Class>Microsoft.Office.DocumentManagement.Internal.DocIdHandler</Class>
+    <Data/>
+    <Filter/>
+  </Receiver>
+  <Receiver>
+    <Name>Document ID Generator</Name>
+    <Synchronization>Synchronous</Synchronization>
+    <Type>10004</Type>
+    <SequenceNumber>1002</SequenceNumber>
+    <Assembly>Microsoft.Office.DocumentManagement, Version=14.0.0.0, Culture=neutral, PublicKeyToken=71e9bce111e9429c</Assembly>
+    <Class>Microsoft.Office.DocumentManagement.Internal.DocIdHandler</Class>
+    <Data/>
+    <Filter/>
+  </Receiver>
+  <Receiver>
+    <Name>Document ID Generator</Name>
+    <Synchronization>Synchronous</Synchronization>
+    <Type>10006</Type>
+    <SequenceNumber>1003</SequenceNumber>
+    <Assembly>Microsoft.Office.DocumentManagement, Version=14.0.0.0, Culture=neutral, PublicKeyToken=71e9bce111e9429c</Assembly>
+    <Class>Microsoft.Office.DocumentManagement.Internal.DocIdHandler</Class>
+    <Data/>
+    <Filter/>
+  </Receiver>
+</spe:Receivers>
+</file>
+
+<file path=customXml/item2.xml><?xml version="1.0" encoding="utf-8"?>
+<p:properties xmlns:p="http://schemas.microsoft.com/office/2006/metadata/properties" xmlns:xsi="http://www.w3.org/2001/XMLSchema-instance" xmlns:pc="http://schemas.microsoft.com/office/infopath/2007/PartnerControls">
+  <documentManagement>
+    <_dlc_DocId xmlns="aff7d12c-bb71-4270-bd29-9c4d45ff3327">346bfafb-41a4-4705-9274-1725a8a4651c</_dlc_DocId>
+    <_dlc_DocIdUrl xmlns="aff7d12c-bb71-4270-bd29-9c4d45ff3327">
+      <Url>https://www.groupware.kuleuven.be/sites/hpc/_layouts/15/DocIdRedir.aspx?ID=346bfafb-41a4-4705-9274-1725a8a4651c</Url>
+      <Description>346bfafb-41a4-4705-9274-1725a8a4651c</Description>
+    </_dlc_DocIdUrl>
+  </documentManagement>
+</p:properties>
+</file>
+
+<file path=customXml/item3.xml><?xml version="1.0" encoding="utf-8"?>
 <ct:contentTypeSchema xmlns:ct="http://schemas.microsoft.com/office/2006/metadata/contentType" xmlns:ma="http://schemas.microsoft.com/office/2006/metadata/properties/metaAttributes" ct:_="" ma:_="" ma:contentTypeName="Document" ma:contentTypeID="0x010100317C36A1CAF973428CFB8DC9B5B73D030400A741C9874CC89F4CB7C7A5AE62CBCD36" ma:contentTypeVersion="2" ma:contentTypeDescription="" ma:contentTypeScope="" ma:versionID="2a5b37c1a06f9995b1548b8fc9b10188">
   <xsd:schema xmlns:xsd="http://www.w3.org/2001/XMLSchema" xmlns:xs="http://www.w3.org/2001/XMLSchema" xmlns:p="http://schemas.microsoft.com/office/2006/metadata/properties" xmlns:ns2="aff7d12c-bb71-4270-bd29-9c4d45ff3327" targetNamespace="http://schemas.microsoft.com/office/2006/metadata/properties" ma:root="true" ma:fieldsID="535495b15c0addd8af32a03863086e70" ns2:_="">
     <xsd:import namespace="aff7d12c-bb71-4270-bd29-9c4d45ff3327"/>
@@ -12179,65 +12237,16 @@
 </ct:contentTypeSchema>
 </file>
 
-<file path=customXml/item2.xml><?xml version="1.0" encoding="utf-8"?>
-<p:properties xmlns:p="http://schemas.microsoft.com/office/2006/metadata/properties" xmlns:xsi="http://www.w3.org/2001/XMLSchema-instance" xmlns:pc="http://schemas.microsoft.com/office/infopath/2007/PartnerControls">
-  <documentManagement>
-    <_dlc_DocId xmlns="aff7d12c-bb71-4270-bd29-9c4d45ff3327">346bfafb-41a4-4705-9274-1725a8a4651c</_dlc_DocId>
-    <_dlc_DocIdUrl xmlns="aff7d12c-bb71-4270-bd29-9c4d45ff3327">
-      <Url>https://www.groupware.kuleuven.be/sites/hpc/_layouts/15/DocIdRedir.aspx?ID=346bfafb-41a4-4705-9274-1725a8a4651c</Url>
-      <Description>346bfafb-41a4-4705-9274-1725a8a4651c</Description>
-    </_dlc_DocIdUrl>
-  </documentManagement>
-</p:properties>
+<file path=customXml/item4.xml><?xml version="1.0" encoding="utf-8"?>
+<?mso-contentType ?>
+<FormTemplates xmlns="http://schemas.microsoft.com/sharepoint/v3/contenttype/forms">
+  <Display>DocumentLibraryForm</Display>
+  <Edit>DocumentLibraryForm</Edit>
+  <New>DocumentLibraryForm</New>
+</FormTemplates>
 </file>
 
-<file path=customXml/item3.xml><?xml version="1.0" encoding="utf-8"?>
-<?mso-contentType ?>
-<spe:Receivers xmlns:spe="http://schemas.microsoft.com/sharepoint/events">
-  <Receiver>
-    <Name>Document ID Generator</Name>
-    <Synchronization>Synchronous</Synchronization>
-    <Type>10001</Type>
-    <SequenceNumber>1000</SequenceNumber>
-    <Assembly>Microsoft.Office.DocumentManagement, Version=14.0.0.0, Culture=neutral, PublicKeyToken=71e9bce111e9429c</Assembly>
-    <Class>Microsoft.Office.DocumentManagement.Internal.DocIdHandler</Class>
-    <Data/>
-    <Filter/>
-  </Receiver>
-  <Receiver>
-    <Name>Document ID Generator</Name>
-    <Synchronization>Synchronous</Synchronization>
-    <Type>10002</Type>
-    <SequenceNumber>1001</SequenceNumber>
-    <Assembly>Microsoft.Office.DocumentManagement, Version=14.0.0.0, Culture=neutral, PublicKeyToken=71e9bce111e9429c</Assembly>
-    <Class>Microsoft.Office.DocumentManagement.Internal.DocIdHandler</Class>
-    <Data/>
-    <Filter/>
-  </Receiver>
-  <Receiver>
-    <Name>Document ID Generator</Name>
-    <Synchronization>Synchronous</Synchronization>
-    <Type>10004</Type>
-    <SequenceNumber>1002</SequenceNumber>
-    <Assembly>Microsoft.Office.DocumentManagement, Version=14.0.0.0, Culture=neutral, PublicKeyToken=71e9bce111e9429c</Assembly>
-    <Class>Microsoft.Office.DocumentManagement.Internal.DocIdHandler</Class>
-    <Data/>
-    <Filter/>
-  </Receiver>
-  <Receiver>
-    <Name>Document ID Generator</Name>
-    <Synchronization>Synchronous</Synchronization>
-    <Type>10006</Type>
-    <SequenceNumber>1003</SequenceNumber>
-    <Assembly>Microsoft.Office.DocumentManagement, Version=14.0.0.0, Culture=neutral, PublicKeyToken=71e9bce111e9429c</Assembly>
-    <Class>Microsoft.Office.DocumentManagement.Internal.DocIdHandler</Class>
-    <Data/>
-    <Filter/>
-  </Receiver>
-</spe:Receivers>
-</file>
-
-<file path=customXml/item4.xml><?xml version="1.0" encoding="utf-8"?>
+<file path=customXml/item5.xml><?xml version="1.0" encoding="utf-8"?>
 <?mso-contentType ?>
 <customXsn xmlns="http://schemas.microsoft.com/office/2006/metadata/customXsn">
   <xsnLocation/>
@@ -12247,29 +12256,10 @@
 </customXsn>
 </file>
 
-<file path=customXml/item5.xml><?xml version="1.0" encoding="utf-8"?>
-<?mso-contentType ?>
-<FormTemplates xmlns="http://schemas.microsoft.com/sharepoint/v3/contenttype/forms">
-  <Display>DocumentLibraryForm</Display>
-  <Edit>DocumentLibraryForm</Edit>
-  <New>DocumentLibraryForm</New>
-</FormTemplates>
-</file>
-
 <file path=customXml/itemProps1.xml><?xml version="1.0" encoding="utf-8"?>
-<ds:datastoreItem xmlns:ds="http://schemas.openxmlformats.org/officeDocument/2006/customXml" ds:itemID="{5D5B35C9-35F5-4278-990B-48710415D639}">
+<ds:datastoreItem xmlns:ds="http://schemas.openxmlformats.org/officeDocument/2006/customXml" ds:itemID="{7732E273-8A47-4E01-AC36-8FF8A6317757}">
   <ds:schemaRefs>
-    <ds:schemaRef ds:uri="http://schemas.microsoft.com/office/2006/metadata/contentType"/>
-    <ds:schemaRef ds:uri="http://schemas.microsoft.com/office/2006/metadata/properties/metaAttributes"/>
-    <ds:schemaRef ds:uri="http://www.w3.org/2001/XMLSchema"/>
-    <ds:schemaRef ds:uri="http://schemas.microsoft.com/office/2006/metadata/properties"/>
-    <ds:schemaRef ds:uri="aff7d12c-bb71-4270-bd29-9c4d45ff3327"/>
-    <ds:schemaRef ds:uri="http://schemas.microsoft.com/office/2006/documentManagement/types"/>
-    <ds:schemaRef ds:uri="http://schemas.microsoft.com/office/infopath/2007/PartnerControls"/>
-    <ds:schemaRef ds:uri="http://schemas.openxmlformats.org/package/2006/metadata/core-properties"/>
-    <ds:schemaRef ds:uri="http://purl.org/dc/elements/1.1/"/>
-    <ds:schemaRef ds:uri="http://purl.org/dc/terms/"/>
-    <ds:schemaRef ds:uri="http://schemas.microsoft.com/internal/obd"/>
+    <ds:schemaRef ds:uri="http://schemas.microsoft.com/sharepoint/events"/>
   </ds:schemaRefs>
 </ds:datastoreItem>
 </file>
@@ -12291,25 +12281,35 @@
 </file>
 
 <file path=customXml/itemProps3.xml><?xml version="1.0" encoding="utf-8"?>
-<ds:datastoreItem xmlns:ds="http://schemas.openxmlformats.org/officeDocument/2006/customXml" ds:itemID="{7732E273-8A47-4E01-AC36-8FF8A6317757}">
+<ds:datastoreItem xmlns:ds="http://schemas.openxmlformats.org/officeDocument/2006/customXml" ds:itemID="{5D5B35C9-35F5-4278-990B-48710415D639}">
   <ds:schemaRefs>
-    <ds:schemaRef ds:uri="http://schemas.microsoft.com/sharepoint/events"/>
+    <ds:schemaRef ds:uri="http://schemas.microsoft.com/office/2006/metadata/contentType"/>
+    <ds:schemaRef ds:uri="http://schemas.microsoft.com/office/2006/metadata/properties/metaAttributes"/>
+    <ds:schemaRef ds:uri="http://www.w3.org/2001/XMLSchema"/>
+    <ds:schemaRef ds:uri="http://schemas.microsoft.com/office/2006/metadata/properties"/>
+    <ds:schemaRef ds:uri="aff7d12c-bb71-4270-bd29-9c4d45ff3327"/>
+    <ds:schemaRef ds:uri="http://schemas.microsoft.com/office/2006/documentManagement/types"/>
+    <ds:schemaRef ds:uri="http://schemas.microsoft.com/office/infopath/2007/PartnerControls"/>
+    <ds:schemaRef ds:uri="http://schemas.openxmlformats.org/package/2006/metadata/core-properties"/>
+    <ds:schemaRef ds:uri="http://purl.org/dc/elements/1.1/"/>
+    <ds:schemaRef ds:uri="http://purl.org/dc/terms/"/>
+    <ds:schemaRef ds:uri="http://schemas.microsoft.com/internal/obd"/>
   </ds:schemaRefs>
 </ds:datastoreItem>
 </file>
 
 <file path=customXml/itemProps4.xml><?xml version="1.0" encoding="utf-8"?>
+<ds:datastoreItem xmlns:ds="http://schemas.openxmlformats.org/officeDocument/2006/customXml" ds:itemID="{564EE3F2-D13D-4835-816B-74B5A421851B}">
+  <ds:schemaRefs>
+    <ds:schemaRef ds:uri="http://schemas.microsoft.com/sharepoint/v3/contenttype/forms"/>
+  </ds:schemaRefs>
+</ds:datastoreItem>
+</file>
+
+<file path=customXml/itemProps5.xml><?xml version="1.0" encoding="utf-8"?>
 <ds:datastoreItem xmlns:ds="http://schemas.openxmlformats.org/officeDocument/2006/customXml" ds:itemID="{F0EF99C1-AFFA-4072-A3F6-6A9C90E28E63}">
   <ds:schemaRefs>
     <ds:schemaRef ds:uri="http://schemas.microsoft.com/office/2006/metadata/customXsn"/>
   </ds:schemaRefs>
 </ds:datastoreItem>
-</file>
-
-<file path=customXml/itemProps5.xml><?xml version="1.0" encoding="utf-8"?>
-<ds:datastoreItem xmlns:ds="http://schemas.openxmlformats.org/officeDocument/2006/customXml" ds:itemID="{564EE3F2-D13D-4835-816B-74B5A421851B}">
-  <ds:schemaRefs>
-    <ds:schemaRef ds:uri="http://schemas.microsoft.com/sharepoint/v3/contenttype/forms"/>
-  </ds:schemaRefs>
-</ds:datastoreItem>
 </file>
</xml_diff>

<commit_message>
FIX: replace matlab examplefor mpi
</commit_message>
<xml_diff>
--- a/VSCintro-demo-slurm.pptx
+++ b/VSCintro-demo-slurm.pptx
@@ -247,7 +247,7 @@
           <a:p>
             <a:fld id="{01F519A0-78CB-4E85-BDD7-0175329041AC}" type="datetimeFigureOut">
               <a:rPr lang="en-US" smtClean="0"/>
-              <a:t>3/27/2023</a:t>
+              <a:t>3/28/2023</a:t>
             </a:fld>
             <a:endParaRPr lang="en-US"/>
           </a:p>
@@ -413,7 +413,7 @@
           <a:p>
             <a:fld id="{337BDF4F-FAE4-4E7A-B003-7AAF79F14F3C}" type="datetimeFigureOut">
               <a:rPr lang="en-US" smtClean="0"/>
-              <a:t>3/27/2023</a:t>
+              <a:t>3/28/2023</a:t>
             </a:fld>
             <a:endParaRPr lang="en-US"/>
           </a:p>
@@ -809,7 +809,7 @@
           <a:bodyPr/>
           <a:lstStyle/>
           <a:p>
-            <a:endParaRPr lang="nl-BE" baseline="0" dirty="0">
+            <a:endParaRPr lang="nl-BE" baseline="0" dirty="0" smtClean="0">
               <a:sym typeface="Wingdings" panose="05000000000000000000" pitchFamily="2" charset="2"/>
             </a:endParaRPr>
           </a:p>
@@ -895,7 +895,7 @@
           <a:bodyPr/>
           <a:lstStyle/>
           <a:p>
-            <a:endParaRPr lang="nl-BE" dirty="0"/>
+            <a:endParaRPr lang="nl-BE" dirty="0" smtClean="0"/>
           </a:p>
         </p:txBody>
       </p:sp>
@@ -1317,7 +1317,7 @@
           <a:p>
             <a:fld id="{12D417FB-DB75-4510-8AD7-5416595AADD8}" type="datetime1">
               <a:rPr lang="en-US" smtClean="0"/>
-              <a:t>3/27/2023</a:t>
+              <a:t>3/28/2023</a:t>
             </a:fld>
             <a:endParaRPr lang="en-US"/>
           </a:p>
@@ -1862,7 +1862,7 @@
           <a:p>
             <a:fld id="{1C565815-05F0-455F-BBD6-9680ABD9D1CB}" type="datetimeFigureOut">
               <a:rPr lang="en-US" smtClean="0"/>
-              <a:t>3/27/2023</a:t>
+              <a:t>3/28/2023</a:t>
             </a:fld>
             <a:endParaRPr lang="en-US"/>
           </a:p>
@@ -2226,7 +2226,7 @@
           <a:p>
             <a:fld id="{1C565815-05F0-455F-BBD6-9680ABD9D1CB}" type="datetimeFigureOut">
               <a:rPr lang="en-US" smtClean="0"/>
-              <a:t>3/27/2023</a:t>
+              <a:t>3/28/2023</a:t>
             </a:fld>
             <a:endParaRPr lang="en-US"/>
           </a:p>
@@ -2343,7 +2343,7 @@
           <a:p>
             <a:fld id="{1C565815-05F0-455F-BBD6-9680ABD9D1CB}" type="datetimeFigureOut">
               <a:rPr lang="en-US" smtClean="0"/>
-              <a:t>3/27/2023</a:t>
+              <a:t>3/28/2023</a:t>
             </a:fld>
             <a:endParaRPr lang="en-US"/>
           </a:p>
@@ -2438,7 +2438,7 @@
           <a:p>
             <a:fld id="{1C565815-05F0-455F-BBD6-9680ABD9D1CB}" type="datetimeFigureOut">
               <a:rPr lang="en-US" smtClean="0"/>
-              <a:t>3/27/2023</a:t>
+              <a:t>3/28/2023</a:t>
             </a:fld>
             <a:endParaRPr lang="en-US"/>
           </a:p>
@@ -2713,7 +2713,7 @@
           <a:p>
             <a:fld id="{1C565815-05F0-455F-BBD6-9680ABD9D1CB}" type="datetimeFigureOut">
               <a:rPr lang="en-US" smtClean="0"/>
-              <a:t>3/27/2023</a:t>
+              <a:t>3/28/2023</a:t>
             </a:fld>
             <a:endParaRPr lang="en-US"/>
           </a:p>
@@ -2965,7 +2965,7 @@
           <a:p>
             <a:fld id="{1C565815-05F0-455F-BBD6-9680ABD9D1CB}" type="datetimeFigureOut">
               <a:rPr lang="en-US" smtClean="0"/>
-              <a:t>3/27/2023</a:t>
+              <a:t>3/28/2023</a:t>
             </a:fld>
             <a:endParaRPr lang="en-US"/>
           </a:p>
@@ -3133,7 +3133,7 @@
           <a:p>
             <a:fld id="{1C565815-05F0-455F-BBD6-9680ABD9D1CB}" type="datetimeFigureOut">
               <a:rPr lang="en-US" smtClean="0"/>
-              <a:t>3/27/2023</a:t>
+              <a:t>3/28/2023</a:t>
             </a:fld>
             <a:endParaRPr lang="en-US"/>
           </a:p>
@@ -3311,7 +3311,7 @@
           <a:p>
             <a:fld id="{1C565815-05F0-455F-BBD6-9680ABD9D1CB}" type="datetimeFigureOut">
               <a:rPr lang="en-US" smtClean="0"/>
-              <a:t>3/27/2023</a:t>
+              <a:t>3/28/2023</a:t>
             </a:fld>
             <a:endParaRPr lang="en-US"/>
           </a:p>
@@ -4118,7 +4118,7 @@
           <a:p>
             <a:fld id="{A1FA2290-0477-46BB-87A2-28AB474124F3}" type="datetime1">
               <a:rPr lang="nl-BE" smtClean="0"/>
-              <a:t>27/03/2023</a:t>
+              <a:t>28/03/2023</a:t>
             </a:fld>
             <a:endParaRPr lang="nl-BE" dirty="0"/>
           </a:p>
@@ -4384,7 +4384,7 @@
           <a:p>
             <a:fld id="{1C565815-05F0-455F-BBD6-9680ABD9D1CB}" type="datetimeFigureOut">
               <a:rPr lang="en-US" smtClean="0"/>
-              <a:t>3/27/2023</a:t>
+              <a:t>3/28/2023</a:t>
             </a:fld>
             <a:endParaRPr lang="en-US"/>
           </a:p>
@@ -4582,7 +4582,7 @@
           <a:p>
             <a:fld id="{1C565815-05F0-455F-BBD6-9680ABD9D1CB}" type="datetimeFigureOut">
               <a:rPr lang="en-US" smtClean="0"/>
-              <a:t>3/27/2023</a:t>
+              <a:t>3/28/2023</a:t>
             </a:fld>
             <a:endParaRPr lang="en-US"/>
           </a:p>
@@ -4827,7 +4827,7 @@
           <a:p>
             <a:fld id="{1C565815-05F0-455F-BBD6-9680ABD9D1CB}" type="datetimeFigureOut">
               <a:rPr lang="en-US" smtClean="0"/>
-              <a:t>3/27/2023</a:t>
+              <a:t>3/28/2023</a:t>
             </a:fld>
             <a:endParaRPr lang="en-US"/>
           </a:p>
@@ -5667,7 +5667,7 @@
           <a:p>
             <a:fld id="{1C565815-05F0-455F-BBD6-9680ABD9D1CB}" type="datetimeFigureOut">
               <a:rPr lang="en-US" smtClean="0"/>
-              <a:t>3/27/2023</a:t>
+              <a:t>3/28/2023</a:t>
             </a:fld>
             <a:endParaRPr lang="en-US"/>
           </a:p>
@@ -6350,6 +6350,13 @@
   <p:clrMapOvr>
     <a:masterClrMapping/>
   </p:clrMapOvr>
+  <p:timing>
+    <p:tnLst>
+      <p:par>
+        <p:cTn id="1" dur="indefinite" restart="never" nodeType="tmRoot"/>
+      </p:par>
+    </p:tnLst>
+  </p:timing>
 </p:sld>
 </file>
 
@@ -6428,16 +6435,25 @@
               </a:buBlip>
             </a:pPr>
             <a:r>
+              <a:rPr lang="en-US" altLang="zh-TW" sz="2000" dirty="0" smtClean="0">
+                <a:solidFill>
+                  <a:srgbClr val="4E5865"/>
+                </a:solidFill>
+                <a:ea typeface="新細明體" panose="02020500000000000000" pitchFamily="18" charset="-120"/>
+              </a:rPr>
+              <a:t>Request </a:t>
+            </a:r>
+            <a:r>
               <a:rPr lang="en-US" altLang="zh-TW" sz="2000" dirty="0">
                 <a:solidFill>
                   <a:srgbClr val="4E5865"/>
                 </a:solidFill>
                 <a:ea typeface="新細明體" panose="02020500000000000000" pitchFamily="18" charset="-120"/>
               </a:rPr>
-              <a:t>Request membership to </a:t>
-            </a:r>
-            <a:r>
-              <a:rPr lang="en-US" altLang="zh-TW" sz="2000" dirty="0" err="1">
+              <a:t>membership to </a:t>
+            </a:r>
+            <a:r>
+              <a:rPr lang="en-US" altLang="zh-TW" sz="2000" dirty="0" err="1" smtClean="0">
                 <a:solidFill>
                   <a:srgbClr val="4E5865"/>
                 </a:solidFill>
@@ -6446,13 +6462,31 @@
               <a:t>lp_hpcinfo</a:t>
             </a:r>
             <a:r>
+              <a:rPr lang="en-US" altLang="zh-TW" sz="2000" dirty="0" smtClean="0">
+                <a:solidFill>
+                  <a:srgbClr val="4E5865"/>
+                </a:solidFill>
+                <a:ea typeface="新細明體" panose="02020500000000000000" pitchFamily="18" charset="-120"/>
+              </a:rPr>
+              <a:t> </a:t>
+            </a:r>
+            <a:r>
               <a:rPr lang="en-US" altLang="zh-TW" sz="2000" dirty="0">
                 <a:solidFill>
                   <a:srgbClr val="4E5865"/>
                 </a:solidFill>
                 <a:ea typeface="新細明體" panose="02020500000000000000" pitchFamily="18" charset="-120"/>
               </a:rPr>
-              <a:t> group (account.vscentrum.be)</a:t>
+              <a:t>group (</a:t>
+            </a:r>
+            <a:r>
+              <a:rPr lang="en-US" altLang="zh-TW" sz="2000" dirty="0" smtClean="0">
+                <a:solidFill>
+                  <a:srgbClr val="4E5865"/>
+                </a:solidFill>
+                <a:ea typeface="新細明體" panose="02020500000000000000" pitchFamily="18" charset="-120"/>
+              </a:rPr>
+              <a:t>account.vscentrum.be)</a:t>
             </a:r>
           </a:p>
           <a:p>
@@ -6462,13 +6496,31 @@
               </a:buBlip>
             </a:pPr>
             <a:r>
+              <a:rPr lang="en-US" altLang="zh-TW" sz="2000" dirty="0" smtClean="0">
+                <a:solidFill>
+                  <a:srgbClr val="4E5865"/>
+                </a:solidFill>
+                <a:ea typeface="新細明體" panose="02020500000000000000" pitchFamily="18" charset="-120"/>
+              </a:rPr>
+              <a:t>Login </a:t>
+            </a:r>
+            <a:r>
               <a:rPr lang="en-US" altLang="zh-TW" sz="2000" dirty="0">
                 <a:solidFill>
                   <a:srgbClr val="4E5865"/>
                 </a:solidFill>
                 <a:ea typeface="新細明體" panose="02020500000000000000" pitchFamily="18" charset="-120"/>
               </a:rPr>
-              <a:t>Login with putty</a:t>
+              <a:t>with </a:t>
+            </a:r>
+            <a:r>
+              <a:rPr lang="en-US" altLang="zh-TW" sz="2000" dirty="0" smtClean="0">
+                <a:solidFill>
+                  <a:srgbClr val="4E5865"/>
+                </a:solidFill>
+                <a:ea typeface="新細明體" panose="02020500000000000000" pitchFamily="18" charset="-120"/>
+              </a:rPr>
+              <a:t>putty</a:t>
             </a:r>
           </a:p>
           <a:p>
@@ -6478,7 +6530,7 @@
               </a:buBlip>
             </a:pPr>
             <a:r>
-              <a:rPr lang="en-US" altLang="zh-TW" sz="2000" dirty="0" err="1">
+              <a:rPr lang="en-US" altLang="zh-TW" sz="2000" dirty="0" err="1" smtClean="0">
                 <a:solidFill>
                   <a:srgbClr val="4E5865"/>
                 </a:solidFill>
@@ -6487,16 +6539,25 @@
               <a:t>Filetransfer</a:t>
             </a:r>
             <a:r>
+              <a:rPr lang="en-US" altLang="zh-TW" sz="2000" dirty="0" smtClean="0">
+                <a:solidFill>
+                  <a:srgbClr val="4E5865"/>
+                </a:solidFill>
+                <a:ea typeface="新細明體" panose="02020500000000000000" pitchFamily="18" charset="-120"/>
+              </a:rPr>
+              <a:t> </a:t>
+            </a:r>
+            <a:r>
               <a:rPr lang="en-US" altLang="zh-TW" sz="2000" dirty="0">
                 <a:solidFill>
                   <a:srgbClr val="4E5865"/>
                 </a:solidFill>
                 <a:ea typeface="新細明體" panose="02020500000000000000" pitchFamily="18" charset="-120"/>
               </a:rPr>
-              <a:t> with </a:t>
-            </a:r>
-            <a:r>
-              <a:rPr lang="en-US" altLang="zh-TW" sz="2000" dirty="0" err="1">
+              <a:t>with </a:t>
+            </a:r>
+            <a:r>
+              <a:rPr lang="en-US" altLang="zh-TW" sz="2000" dirty="0" err="1" smtClean="0">
                 <a:solidFill>
                   <a:srgbClr val="4E5865"/>
                 </a:solidFill>
@@ -6518,13 +6579,31 @@
               </a:buBlip>
             </a:pPr>
             <a:r>
+              <a:rPr lang="en-US" altLang="zh-TW" sz="2000" dirty="0" smtClean="0">
+                <a:solidFill>
+                  <a:srgbClr val="4E5865"/>
+                </a:solidFill>
+                <a:ea typeface="新細明體" panose="02020500000000000000" pitchFamily="18" charset="-120"/>
+              </a:rPr>
+              <a:t>Login </a:t>
+            </a:r>
+            <a:r>
               <a:rPr lang="en-US" altLang="zh-TW" sz="2000" dirty="0">
                 <a:solidFill>
                   <a:srgbClr val="4E5865"/>
                 </a:solidFill>
                 <a:ea typeface="新細明體" panose="02020500000000000000" pitchFamily="18" charset="-120"/>
               </a:rPr>
-              <a:t>Login with NX</a:t>
+              <a:t>with </a:t>
+            </a:r>
+            <a:r>
+              <a:rPr lang="en-US" altLang="zh-TW" sz="2000" dirty="0" smtClean="0">
+                <a:solidFill>
+                  <a:srgbClr val="4E5865"/>
+                </a:solidFill>
+                <a:ea typeface="新細明體" panose="02020500000000000000" pitchFamily="18" charset="-120"/>
+              </a:rPr>
+              <a:t>NX</a:t>
             </a:r>
           </a:p>
           <a:p>
@@ -6534,13 +6613,31 @@
               </a:buBlip>
             </a:pPr>
             <a:r>
+              <a:rPr lang="en-US" altLang="zh-TW" sz="2000" dirty="0" smtClean="0">
+                <a:solidFill>
+                  <a:srgbClr val="4E5865"/>
+                </a:solidFill>
+                <a:ea typeface="新細明體" panose="02020500000000000000" pitchFamily="18" charset="-120"/>
+              </a:rPr>
+              <a:t>Check </a:t>
+            </a:r>
+            <a:r>
               <a:rPr lang="en-US" altLang="zh-TW" sz="2000" dirty="0">
                 <a:solidFill>
                   <a:srgbClr val="4E5865"/>
                 </a:solidFill>
                 <a:ea typeface="新細明體" panose="02020500000000000000" pitchFamily="18" charset="-120"/>
               </a:rPr>
-              <a:t>Check disk quota</a:t>
+              <a:t>disk </a:t>
+            </a:r>
+            <a:r>
+              <a:rPr lang="en-US" altLang="zh-TW" sz="2000" dirty="0" smtClean="0">
+                <a:solidFill>
+                  <a:srgbClr val="4E5865"/>
+                </a:solidFill>
+                <a:ea typeface="新細明體" panose="02020500000000000000" pitchFamily="18" charset="-120"/>
+              </a:rPr>
+              <a:t>quota</a:t>
             </a:r>
           </a:p>
           <a:p>
@@ -6550,13 +6647,31 @@
               </a:buBlip>
             </a:pPr>
             <a:r>
+              <a:rPr lang="en-US" altLang="zh-TW" sz="2000" dirty="0" smtClean="0">
+                <a:solidFill>
+                  <a:srgbClr val="4E5865"/>
+                </a:solidFill>
+                <a:ea typeface="新細明體" panose="02020500000000000000" pitchFamily="18" charset="-120"/>
+              </a:rPr>
+              <a:t>Check </a:t>
+            </a:r>
+            <a:r>
               <a:rPr lang="en-US" altLang="zh-TW" sz="2000" dirty="0">
                 <a:solidFill>
                   <a:srgbClr val="4E5865"/>
                 </a:solidFill>
                 <a:ea typeface="新細明體" panose="02020500000000000000" pitchFamily="18" charset="-120"/>
               </a:rPr>
-              <a:t>Check the credits</a:t>
+              <a:t>the </a:t>
+            </a:r>
+            <a:r>
+              <a:rPr lang="en-US" altLang="zh-TW" sz="2000" dirty="0" smtClean="0">
+                <a:solidFill>
+                  <a:srgbClr val="4E5865"/>
+                </a:solidFill>
+                <a:ea typeface="新細明體" panose="02020500000000000000" pitchFamily="18" charset="-120"/>
+              </a:rPr>
+              <a:t>credits</a:t>
             </a:r>
           </a:p>
           <a:p>
@@ -6566,7 +6681,7 @@
               </a:buBlip>
             </a:pPr>
             <a:r>
-              <a:rPr lang="en-US" altLang="zh-TW" sz="2000" dirty="0">
+              <a:rPr lang="en-US" altLang="zh-TW" sz="2000" dirty="0" smtClean="0">
                 <a:solidFill>
                   <a:srgbClr val="4E5865"/>
                 </a:solidFill>
@@ -6574,6 +6689,12 @@
               </a:rPr>
               <a:t>Check/load/list/unload/purge module</a:t>
             </a:r>
+            <a:endParaRPr lang="en-US" altLang="zh-TW" sz="2000" dirty="0">
+              <a:solidFill>
+                <a:srgbClr val="4E5865"/>
+              </a:solidFill>
+              <a:ea typeface="新細明體" panose="02020500000000000000" pitchFamily="18" charset="-120"/>
+            </a:endParaRPr>
           </a:p>
           <a:p>
             <a:endParaRPr lang="nl-BE" sz="2400" dirty="0">
@@ -6628,6 +6749,13 @@
   <p:clrMapOvr>
     <a:masterClrMapping/>
   </p:clrMapOvr>
+  <p:timing>
+    <p:tnLst>
+      <p:par>
+        <p:cTn id="1" dur="indefinite" restart="never" nodeType="tmRoot"/>
+      </p:par>
+    </p:tnLst>
+  </p:timing>
 </p:sld>
 </file>
 
@@ -6712,10 +6840,19 @@
                 </a:solidFill>
                 <a:ea typeface="新細明體" panose="02020500000000000000" pitchFamily="18" charset="-120"/>
               </a:rPr>
-              <a:t>Copy intro training files </a:t>
-            </a:r>
-            <a:r>
-              <a:rPr lang="en-US" altLang="zh-TW" sz="2000" dirty="0">
+              <a:t>Copy intro training </a:t>
+            </a:r>
+            <a:r>
+              <a:rPr lang="en-US" altLang="zh-TW" sz="2400" dirty="0" smtClean="0">
+                <a:solidFill>
+                  <a:srgbClr val="4E5865"/>
+                </a:solidFill>
+                <a:ea typeface="新細明體" panose="02020500000000000000" pitchFamily="18" charset="-120"/>
+              </a:rPr>
+              <a:t>files </a:t>
+            </a:r>
+            <a:r>
+              <a:rPr lang="en-US" altLang="zh-TW" sz="2000" dirty="0" smtClean="0">
                 <a:solidFill>
                   <a:srgbClr val="4E5865"/>
                 </a:solidFill>
@@ -6726,7 +6863,7 @@
               <a:t>/apps/</a:t>
             </a:r>
             <a:r>
-              <a:rPr lang="en-US" altLang="zh-TW" sz="2000" dirty="0" err="1">
+              <a:rPr lang="en-US" altLang="zh-TW" sz="2000" dirty="0" err="1" smtClean="0">
                 <a:solidFill>
                   <a:srgbClr val="4E5865"/>
                 </a:solidFill>
@@ -6737,7 +6874,7 @@
               <a:t>leuven</a:t>
             </a:r>
             <a:r>
-              <a:rPr lang="en-US" altLang="zh-TW" sz="2000" dirty="0">
+              <a:rPr lang="en-US" altLang="zh-TW" sz="2000" dirty="0" smtClean="0">
                 <a:solidFill>
                   <a:srgbClr val="4E5865"/>
                 </a:solidFill>
@@ -6748,7 +6885,7 @@
               <a:t>/training/</a:t>
             </a:r>
             <a:r>
-              <a:rPr lang="en-US" altLang="zh-TW" sz="2000" dirty="0" err="1">
+              <a:rPr lang="en-US" altLang="zh-TW" sz="2000" dirty="0" err="1" smtClean="0">
                 <a:solidFill>
                   <a:srgbClr val="4E5865"/>
                 </a:solidFill>
@@ -6759,7 +6896,7 @@
               <a:t>HPC_intro</a:t>
             </a:r>
             <a:r>
-              <a:rPr lang="en-US" altLang="zh-TW" sz="2000" dirty="0">
+              <a:rPr lang="en-US" altLang="zh-TW" sz="2000" dirty="0" smtClean="0">
                 <a:solidFill>
                   <a:srgbClr val="4E5865"/>
                 </a:solidFill>
@@ -6851,7 +6988,7 @@
               <a:t>List all your jobs </a:t>
             </a:r>
             <a:r>
-              <a:rPr lang="en-US" altLang="zh-TW" sz="2000" dirty="0" err="1">
+              <a:rPr lang="en-US" altLang="zh-TW" sz="2000" dirty="0" err="1" smtClean="0">
                 <a:solidFill>
                   <a:srgbClr val="4E5865"/>
                 </a:solidFill>
@@ -6862,7 +6999,7 @@
               <a:t>squeue</a:t>
             </a:r>
             <a:r>
-              <a:rPr lang="en-US" altLang="zh-TW" sz="2000" dirty="0">
+              <a:rPr lang="en-US" altLang="zh-TW" sz="2000" dirty="0" smtClean="0">
                 <a:solidFill>
                   <a:srgbClr val="4E5865"/>
                 </a:solidFill>
@@ -6873,7 +7010,7 @@
               <a:t> -M </a:t>
             </a:r>
             <a:r>
-              <a:rPr lang="en-US" altLang="zh-TW" sz="2000" dirty="0" err="1">
+              <a:rPr lang="en-US" altLang="zh-TW" sz="2000" dirty="0" err="1" smtClean="0">
                 <a:solidFill>
                   <a:srgbClr val="4E5865"/>
                 </a:solidFill>
@@ -6924,7 +7061,7 @@
               <a:t> </a:t>
             </a:r>
             <a:r>
-              <a:rPr lang="en-US" altLang="zh-TW" sz="2000" dirty="0" err="1">
+              <a:rPr lang="en-US" altLang="zh-TW" sz="2000" dirty="0" err="1" smtClean="0">
                 <a:solidFill>
                   <a:srgbClr val="4E5865"/>
                 </a:solidFill>
@@ -6935,7 +7072,7 @@
               <a:t>slurm_jobinfo</a:t>
             </a:r>
             <a:r>
-              <a:rPr lang="en-US" altLang="zh-TW" sz="2000" dirty="0">
+              <a:rPr lang="en-US" altLang="zh-TW" sz="2000" dirty="0" smtClean="0">
                 <a:solidFill>
                   <a:srgbClr val="4E5865"/>
                 </a:solidFill>
@@ -6946,7 +7083,7 @@
               <a:t> -M </a:t>
             </a:r>
             <a:r>
-              <a:rPr lang="en-US" altLang="zh-TW" sz="2000" dirty="0" err="1">
+              <a:rPr lang="en-US" altLang="zh-TW" sz="2000" dirty="0" err="1" smtClean="0">
                 <a:solidFill>
                   <a:srgbClr val="4E5865"/>
                 </a:solidFill>
@@ -6957,7 +7094,7 @@
               <a:t>wice</a:t>
             </a:r>
             <a:r>
-              <a:rPr lang="en-US" altLang="zh-TW" sz="2000" dirty="0">
+              <a:rPr lang="en-US" altLang="zh-TW" sz="2000" dirty="0" smtClean="0">
                 <a:solidFill>
                   <a:srgbClr val="4E5865"/>
                 </a:solidFill>
@@ -6968,7 +7105,7 @@
               <a:t> &lt;</a:t>
             </a:r>
             <a:r>
-              <a:rPr lang="en-US" altLang="zh-TW" sz="2000" dirty="0" err="1">
+              <a:rPr lang="en-US" altLang="zh-TW" sz="2000" dirty="0" err="1" smtClean="0">
                 <a:solidFill>
                   <a:srgbClr val="4E5865"/>
                 </a:solidFill>
@@ -6979,7 +7116,7 @@
               <a:t>job_ID</a:t>
             </a:r>
             <a:r>
-              <a:rPr lang="en-US" altLang="zh-TW" sz="2000" dirty="0">
+              <a:rPr lang="en-US" altLang="zh-TW" sz="2000" dirty="0" smtClean="0">
                 <a:solidFill>
                   <a:srgbClr val="4E5865"/>
                 </a:solidFill>
@@ -7012,7 +7149,7 @@
               <a:t>Modify the </a:t>
             </a:r>
             <a:r>
-              <a:rPr lang="en-US" altLang="zh-TW" sz="2400" dirty="0" err="1">
+              <a:rPr lang="en-US" altLang="zh-TW" sz="2400" dirty="0" err="1" smtClean="0">
                 <a:solidFill>
                   <a:srgbClr val="4E5865"/>
                 </a:solidFill>
@@ -7021,13 +7158,40 @@
               <a:t>mpi.slurm</a:t>
             </a:r>
             <a:r>
+              <a:rPr lang="en-US" altLang="zh-TW" sz="2400" dirty="0" smtClean="0">
+                <a:solidFill>
+                  <a:srgbClr val="4E5865"/>
+                </a:solidFill>
+                <a:ea typeface="新細明體" panose="02020500000000000000" pitchFamily="18" charset="-120"/>
+              </a:rPr>
+              <a:t> </a:t>
+            </a:r>
+            <a:r>
               <a:rPr lang="en-US" altLang="zh-TW" sz="2400" dirty="0">
                 <a:solidFill>
                   <a:srgbClr val="4E5865"/>
                 </a:solidFill>
                 <a:ea typeface="新細明體" panose="02020500000000000000" pitchFamily="18" charset="-120"/>
               </a:rPr>
-              <a:t> script to request 1 node, 72 cores for 30 minutes and get the notification about job start/end by e-mail</a:t>
+              <a:t>script to request 1 node, </a:t>
+            </a:r>
+            <a:r>
+              <a:rPr lang="en-US" altLang="zh-TW" sz="2400" dirty="0" smtClean="0">
+                <a:solidFill>
+                  <a:srgbClr val="4E5865"/>
+                </a:solidFill>
+                <a:ea typeface="新細明體" panose="02020500000000000000" pitchFamily="18" charset="-120"/>
+              </a:rPr>
+              <a:t>72 </a:t>
+            </a:r>
+            <a:r>
+              <a:rPr lang="en-US" altLang="zh-TW" sz="2400" dirty="0">
+                <a:solidFill>
+                  <a:srgbClr val="4E5865"/>
+                </a:solidFill>
+                <a:ea typeface="新細明體" panose="02020500000000000000" pitchFamily="18" charset="-120"/>
+              </a:rPr>
+              <a:t>cores for 30 minutes and get the notification about job start/end by e-mail</a:t>
             </a:r>
           </a:p>
           <a:p>
@@ -7110,6 +7274,13 @@
   <p:clrMapOvr>
     <a:masterClrMapping/>
   </p:clrMapOvr>
+  <p:timing>
+    <p:tnLst>
+      <p:par>
+        <p:cTn id="1" dur="indefinite" restart="never" nodeType="tmRoot"/>
+      </p:par>
+    </p:tnLst>
+  </p:timing>
 </p:sld>
 </file>
 
@@ -7202,13 +7373,22 @@
               <a:buNone/>
             </a:pPr>
             <a:r>
+              <a:rPr lang="en-US" altLang="zh-TW" sz="2400" dirty="0" smtClean="0">
+                <a:solidFill>
+                  <a:srgbClr val="4E5865"/>
+                </a:solidFill>
+                <a:ea typeface="新細明體" panose="02020500000000000000" pitchFamily="18" charset="-120"/>
+              </a:rPr>
+              <a:t>	Run </a:t>
+            </a:r>
+            <a:r>
               <a:rPr lang="en-US" altLang="zh-TW" sz="2400" dirty="0">
                 <a:solidFill>
                   <a:srgbClr val="4E5865"/>
                 </a:solidFill>
                 <a:ea typeface="新細明體" panose="02020500000000000000" pitchFamily="18" charset="-120"/>
               </a:rPr>
-              <a:t>	Run your program on a compute node</a:t>
+              <a:t>your program on a compute node</a:t>
             </a:r>
           </a:p>
           <a:p>
@@ -7216,13 +7396,22 @@
               <a:buNone/>
             </a:pPr>
             <a:r>
+              <a:rPr lang="en-US" altLang="zh-TW" sz="2400" dirty="0" smtClean="0">
+                <a:solidFill>
+                  <a:srgbClr val="4E5865"/>
+                </a:solidFill>
+                <a:ea typeface="新細明體" panose="02020500000000000000" pitchFamily="18" charset="-120"/>
+              </a:rPr>
+              <a:t>	Open </a:t>
+            </a:r>
+            <a:r>
               <a:rPr lang="en-US" altLang="zh-TW" sz="2400" dirty="0">
                 <a:solidFill>
                   <a:srgbClr val="4E5865"/>
                 </a:solidFill>
                 <a:ea typeface="新細明體" panose="02020500000000000000" pitchFamily="18" charset="-120"/>
               </a:rPr>
-              <a:t>	Open a new terminal and </a:t>
+              <a:t>a new terminal and </a:t>
             </a:r>
             <a:r>
               <a:rPr lang="en-US" altLang="zh-TW" sz="2400" dirty="0" err="1">
@@ -7248,13 +7437,22 @@
               <a:buNone/>
             </a:pPr>
             <a:r>
+              <a:rPr lang="en-US" altLang="zh-TW" sz="2400" dirty="0" smtClean="0">
+                <a:solidFill>
+                  <a:srgbClr val="4E5865"/>
+                </a:solidFill>
+                <a:ea typeface="新細明體" panose="02020500000000000000" pitchFamily="18" charset="-120"/>
+              </a:rPr>
+              <a:t>	Check </a:t>
+            </a:r>
+            <a:r>
               <a:rPr lang="en-US" altLang="zh-TW" sz="2400" dirty="0">
                 <a:solidFill>
                   <a:srgbClr val="4E5865"/>
                 </a:solidFill>
                 <a:ea typeface="新細明體" panose="02020500000000000000" pitchFamily="18" charset="-120"/>
               </a:rPr>
-              <a:t>	Check the resources usage (</a:t>
+              <a:t>the resources usage (</a:t>
             </a:r>
             <a:r>
               <a:rPr lang="en-US" altLang="zh-TW" sz="2400" dirty="0">
@@ -7268,7 +7466,7 @@
               <a:t>top</a:t>
             </a:r>
             <a:r>
-              <a:rPr lang="en-US" altLang="zh-TW" sz="2400" dirty="0">
+              <a:rPr lang="en-US" altLang="zh-TW" sz="2400" dirty="0" smtClean="0">
                 <a:solidFill>
                   <a:srgbClr val="4E5865"/>
                 </a:solidFill>
@@ -7295,13 +7493,22 @@
               </a:buBlip>
             </a:pPr>
             <a:r>
+              <a:rPr lang="en-US" altLang="zh-TW" sz="2400" dirty="0" smtClean="0">
+                <a:solidFill>
+                  <a:srgbClr val="4E5865"/>
+                </a:solidFill>
+                <a:ea typeface="新細明體" panose="02020500000000000000" pitchFamily="18" charset="-120"/>
+              </a:rPr>
+              <a:t>Submit </a:t>
+            </a:r>
+            <a:r>
               <a:rPr lang="en-US" altLang="zh-TW" sz="2400" dirty="0">
                 <a:solidFill>
                   <a:srgbClr val="4E5865"/>
                 </a:solidFill>
                 <a:ea typeface="新細明體" panose="02020500000000000000" pitchFamily="18" charset="-120"/>
               </a:rPr>
-              <a:t>Submit a batch GPU job </a:t>
+              <a:t>a batch GPU job </a:t>
             </a:r>
           </a:p>
           <a:p>
@@ -7312,16 +7519,25 @@
               </a:tabLst>
             </a:pPr>
             <a:r>
+              <a:rPr lang="en-US" altLang="zh-TW" sz="2400" dirty="0" smtClean="0">
+                <a:solidFill>
+                  <a:srgbClr val="4E5865"/>
+                </a:solidFill>
+                <a:ea typeface="新細明體" panose="02020500000000000000" pitchFamily="18" charset="-120"/>
+              </a:rPr>
+              <a:t>	While </a:t>
+            </a:r>
+            <a:r>
               <a:rPr lang="en-US" altLang="zh-TW" sz="2400" dirty="0">
                 <a:solidFill>
                   <a:srgbClr val="4E5865"/>
                 </a:solidFill>
                 <a:ea typeface="新細明體" panose="02020500000000000000" pitchFamily="18" charset="-120"/>
               </a:rPr>
-              <a:t>	While the job is running get the information about the node </a:t>
-            </a:r>
-            <a:r>
-              <a:rPr lang="en-US" altLang="zh-TW" dirty="0" err="1">
+              <a:t>the job is running get the information about the node </a:t>
+            </a:r>
+            <a:r>
+              <a:rPr lang="en-US" altLang="zh-TW" dirty="0" err="1" smtClean="0">
                 <a:solidFill>
                   <a:srgbClr val="4E5865"/>
                 </a:solidFill>
@@ -7332,7 +7548,7 @@
               <a:t>slurm_jobinfo</a:t>
             </a:r>
             <a:r>
-              <a:rPr lang="en-US" altLang="zh-TW" dirty="0">
+              <a:rPr lang="en-US" altLang="zh-TW" dirty="0" smtClean="0">
                 <a:solidFill>
                   <a:srgbClr val="4E5865"/>
                 </a:solidFill>
@@ -7342,7 +7558,7 @@
               </a:rPr>
               <a:t>...</a:t>
             </a:r>
-            <a:endParaRPr lang="en-US" altLang="zh-TW" dirty="0">
+            <a:endParaRPr lang="en-US" altLang="zh-TW" dirty="0" smtClean="0">
               <a:solidFill>
                 <a:srgbClr val="4E5865"/>
               </a:solidFill>
@@ -7363,10 +7579,28 @@
                 </a:solidFill>
                 <a:ea typeface="新細明體" panose="02020500000000000000" pitchFamily="18" charset="-120"/>
               </a:rPr>
-              <a:t>	and check usage of resources on the node </a:t>
-            </a:r>
-            <a:r>
-              <a:rPr lang="en-US" altLang="zh-TW" dirty="0" err="1">
+              <a:t>	</a:t>
+            </a:r>
+            <a:r>
+              <a:rPr lang="en-US" altLang="zh-TW" sz="2400" dirty="0" smtClean="0">
+                <a:solidFill>
+                  <a:srgbClr val="4E5865"/>
+                </a:solidFill>
+                <a:ea typeface="新細明體" panose="02020500000000000000" pitchFamily="18" charset="-120"/>
+              </a:rPr>
+              <a:t>and </a:t>
+            </a:r>
+            <a:r>
+              <a:rPr lang="en-US" altLang="zh-TW" sz="2400" dirty="0">
+                <a:solidFill>
+                  <a:srgbClr val="4E5865"/>
+                </a:solidFill>
+                <a:ea typeface="新細明體" panose="02020500000000000000" pitchFamily="18" charset="-120"/>
+              </a:rPr>
+              <a:t>check usage of resources on the node </a:t>
+            </a:r>
+            <a:r>
+              <a:rPr lang="en-US" altLang="zh-TW" dirty="0" err="1" smtClean="0">
                 <a:solidFill>
                   <a:srgbClr val="4E5865"/>
                 </a:solidFill>
@@ -7406,7 +7640,7 @@
               <a:t>, </a:t>
             </a:r>
             <a:r>
-              <a:rPr lang="en-US" altLang="zh-TW" dirty="0" err="1">
+              <a:rPr lang="en-US" altLang="zh-TW" dirty="0" err="1" smtClean="0">
                 <a:solidFill>
                   <a:srgbClr val="4E5865"/>
                 </a:solidFill>
@@ -7469,6 +7703,13 @@
   <p:clrMapOvr>
     <a:masterClrMapping/>
   </p:clrMapOvr>
+  <p:timing>
+    <p:tnLst>
+      <p:par>
+        <p:cTn id="1" dur="indefinite" restart="never" nodeType="tmRoot"/>
+      </p:par>
+    </p:tnLst>
+  </p:timing>
 </p:sld>
 </file>
 
@@ -8096,6 +8337,13 @@
   <p:clrMapOvr>
     <a:masterClrMapping/>
   </p:clrMapOvr>
+  <p:timing>
+    <p:tnLst>
+      <p:par>
+        <p:cTn id="1" dur="indefinite" restart="never" nodeType="tmRoot"/>
+      </p:par>
+    </p:tnLst>
+  </p:timing>
 </p:sld>
 </file>
 
@@ -8597,6 +8845,13 @@
   <p:clrMapOvr>
     <a:masterClrMapping/>
   </p:clrMapOvr>
+  <p:timing>
+    <p:tnLst>
+      <p:par>
+        <p:cTn id="1" dur="indefinite" restart="never" nodeType="tmRoot"/>
+      </p:par>
+    </p:tnLst>
+  </p:timing>
 </p:sld>
 </file>
 
@@ -9221,6 +9476,13 @@
   <p:clrMapOvr>
     <a:masterClrMapping/>
   </p:clrMapOvr>
+  <p:timing>
+    <p:tnLst>
+      <p:par>
+        <p:cTn id="1" dur="indefinite" restart="never" nodeType="tmRoot"/>
+      </p:par>
+    </p:tnLst>
+  </p:timing>
 </p:sld>
 </file>
 
@@ -9258,7 +9520,7 @@
         </p:nvGraphicFramePr>
         <p:xfrm>
           <a:off x="108155" y="81234"/>
-          <a:ext cx="12015019" cy="6022386"/>
+          <a:ext cx="12015019" cy="6040024"/>
         </p:xfrm>
         <a:graphic>
           <a:graphicData uri="http://schemas.openxmlformats.org/drawingml/2006/table">
@@ -10599,7 +10861,7 @@
                 <a:hlinkClick r:id="rId2">
                   <a:extLst>
                     <a:ext uri="{A12FA001-AC4F-418D-AE19-62706E023703}">
-                      <ahyp:hlinkClr xmlns:ahyp="http://schemas.microsoft.com/office/drawing/2018/hyperlinkcolor" val="tx"/>
+                      <ahyp:hlinkClr xmlns:ahyp="http://schemas.microsoft.com/office/drawing/2018/hyperlinkcolor" xmlns="" val="tx"/>
                     </a:ext>
                   </a:extLst>
                 </a:hlinkClick>
@@ -10626,7 +10888,7 @@
                 <a:hlinkClick r:id="rId3">
                   <a:extLst>
                     <a:ext uri="{A12FA001-AC4F-418D-AE19-62706E023703}">
-                      <ahyp:hlinkClr xmlns:ahyp="http://schemas.microsoft.com/office/drawing/2018/hyperlinkcolor" val="tx"/>
+                      <ahyp:hlinkClr xmlns:ahyp="http://schemas.microsoft.com/office/drawing/2018/hyperlinkcolor" xmlns="" val="tx"/>
                     </a:ext>
                   </a:extLst>
                 </a:hlinkClick>
@@ -10662,7 +10924,7 @@
                 <a:hlinkClick r:id="rId4">
                   <a:extLst>
                     <a:ext uri="{A12FA001-AC4F-418D-AE19-62706E023703}">
-                      <ahyp:hlinkClr xmlns:ahyp="http://schemas.microsoft.com/office/drawing/2018/hyperlinkcolor" val="tx"/>
+                      <ahyp:hlinkClr xmlns:ahyp="http://schemas.microsoft.com/office/drawing/2018/hyperlinkcolor" xmlns="" val="tx"/>
                     </a:ext>
                   </a:extLst>
                 </a:hlinkClick>
@@ -10691,6 +10953,10 @@
               </a:rPr>
               <a:t>https://docs.vscentrum.be/</a:t>
             </a:r>
+            <a:r>
+              <a:rPr lang="nl-BE" sz="2000" dirty="0"/>
+              <a:t/>
+            </a:r>
             <a:br>
               <a:rPr lang="nl-BE" sz="2000" dirty="0"/>
             </a:br>
@@ -10721,7 +10987,7 @@
                 <a:hlinkClick r:id="rId5">
                   <a:extLst>
                     <a:ext uri="{A12FA001-AC4F-418D-AE19-62706E023703}">
-                      <ahyp:hlinkClr xmlns:ahyp="http://schemas.microsoft.com/office/drawing/2018/hyperlinkcolor" val="tx"/>
+                      <ahyp:hlinkClr xmlns:ahyp="http://schemas.microsoft.com/office/drawing/2018/hyperlinkcolor" xmlns="" val="tx"/>
                     </a:ext>
                   </a:extLst>
                 </a:hlinkClick>
@@ -10783,6 +11049,13 @@
   <p:transition spd="slow">
     <p:cover/>
   </p:transition>
+  <p:timing>
+    <p:tnLst>
+      <p:par>
+        <p:cTn id="1" dur="indefinite" restart="never" nodeType="tmRoot"/>
+      </p:par>
+    </p:tnLst>
+  </p:timing>
 </p:sld>
 </file>
 
@@ -11771,71 +12044,6 @@
 </file>
 
 <file path=customXml/item1.xml><?xml version="1.0" encoding="utf-8"?>
-<?mso-contentType ?>
-<spe:Receivers xmlns:spe="http://schemas.microsoft.com/sharepoint/events">
-  <Receiver>
-    <Name>Document ID Generator</Name>
-    <Synchronization>Synchronous</Synchronization>
-    <Type>10001</Type>
-    <SequenceNumber>1000</SequenceNumber>
-    <Assembly>Microsoft.Office.DocumentManagement, Version=14.0.0.0, Culture=neutral, PublicKeyToken=71e9bce111e9429c</Assembly>
-    <Class>Microsoft.Office.DocumentManagement.Internal.DocIdHandler</Class>
-    <Data/>
-    <Filter/>
-  </Receiver>
-  <Receiver>
-    <Name>Document ID Generator</Name>
-    <Synchronization>Synchronous</Synchronization>
-    <Type>10002</Type>
-    <SequenceNumber>1001</SequenceNumber>
-    <Assembly>Microsoft.Office.DocumentManagement, Version=14.0.0.0, Culture=neutral, PublicKeyToken=71e9bce111e9429c</Assembly>
-    <Class>Microsoft.Office.DocumentManagement.Internal.DocIdHandler</Class>
-    <Data/>
-    <Filter/>
-  </Receiver>
-  <Receiver>
-    <Name>Document ID Generator</Name>
-    <Synchronization>Synchronous</Synchronization>
-    <Type>10004</Type>
-    <SequenceNumber>1002</SequenceNumber>
-    <Assembly>Microsoft.Office.DocumentManagement, Version=14.0.0.0, Culture=neutral, PublicKeyToken=71e9bce111e9429c</Assembly>
-    <Class>Microsoft.Office.DocumentManagement.Internal.DocIdHandler</Class>
-    <Data/>
-    <Filter/>
-  </Receiver>
-  <Receiver>
-    <Name>Document ID Generator</Name>
-    <Synchronization>Synchronous</Synchronization>
-    <Type>10006</Type>
-    <SequenceNumber>1003</SequenceNumber>
-    <Assembly>Microsoft.Office.DocumentManagement, Version=14.0.0.0, Culture=neutral, PublicKeyToken=71e9bce111e9429c</Assembly>
-    <Class>Microsoft.Office.DocumentManagement.Internal.DocIdHandler</Class>
-    <Data/>
-    <Filter/>
-  </Receiver>
-</spe:Receivers>
-</file>
-
-<file path=customXml/item2.xml><?xml version="1.0" encoding="utf-8"?>
-<?mso-contentType ?>
-<customXsn xmlns="http://schemas.microsoft.com/office/2006/metadata/customXsn">
-  <xsnLocation/>
-  <cached>True</cached>
-  <openByDefault>True</openByDefault>
-  <xsnScope>/sites/hpc</xsnScope>
-</customXsn>
-</file>
-
-<file path=customXml/item3.xml><?xml version="1.0" encoding="utf-8"?>
-<?mso-contentType ?>
-<FormTemplates xmlns="http://schemas.microsoft.com/sharepoint/v3/contenttype/forms">
-  <Display>DocumentLibraryForm</Display>
-  <Edit>DocumentLibraryForm</Edit>
-  <New>DocumentLibraryForm</New>
-</FormTemplates>
-</file>
-
-<file path=customXml/item4.xml><?xml version="1.0" encoding="utf-8"?>
 <ct:contentTypeSchema xmlns:ct="http://schemas.microsoft.com/office/2006/metadata/contentType" xmlns:ma="http://schemas.microsoft.com/office/2006/metadata/properties/metaAttributes" ct:_="" ma:_="" ma:contentTypeName="Document" ma:contentTypeID="0x010100317C36A1CAF973428CFB8DC9B5B73D030400A741C9874CC89F4CB7C7A5AE62CBCD36" ma:contentTypeVersion="2" ma:contentTypeDescription="" ma:contentTypeScope="" ma:versionID="2a5b37c1a06f9995b1548b8fc9b10188">
   <xsd:schema xmlns:xsd="http://www.w3.org/2001/XMLSchema" xmlns:xs="http://www.w3.org/2001/XMLSchema" xmlns:p="http://schemas.microsoft.com/office/2006/metadata/properties" xmlns:ns2="aff7d12c-bb71-4270-bd29-9c4d45ff3327" targetNamespace="http://schemas.microsoft.com/office/2006/metadata/properties" ma:root="true" ma:fieldsID="535495b15c0addd8af32a03863086e70" ns2:_="">
     <xsd:import namespace="aff7d12c-bb71-4270-bd29-9c4d45ff3327"/>
@@ -11980,7 +12188,7 @@
 </ct:contentTypeSchema>
 </file>
 
-<file path=customXml/item5.xml><?xml version="1.0" encoding="utf-8"?>
+<file path=customXml/item2.xml><?xml version="1.0" encoding="utf-8"?>
 <p:properties xmlns:p="http://schemas.microsoft.com/office/2006/metadata/properties" xmlns:xsi="http://www.w3.org/2001/XMLSchema-instance" xmlns:pc="http://schemas.microsoft.com/office/infopath/2007/PartnerControls">
   <documentManagement>
     <_dlc_DocId xmlns="aff7d12c-bb71-4270-bd29-9c4d45ff3327">346bfafb-41a4-4705-9274-1725a8a4651c</_dlc_DocId>
@@ -11992,31 +12200,72 @@
 </p:properties>
 </file>
 
-<file path=customXml/itemProps1.xml><?xml version="1.0" encoding="utf-8"?>
-<ds:datastoreItem xmlns:ds="http://schemas.openxmlformats.org/officeDocument/2006/customXml" ds:itemID="{7732E273-8A47-4E01-AC36-8FF8A6317757}">
-  <ds:schemaRefs>
-    <ds:schemaRef ds:uri="http://schemas.microsoft.com/sharepoint/events"/>
-  </ds:schemaRefs>
-</ds:datastoreItem>
+<file path=customXml/item3.xml><?xml version="1.0" encoding="utf-8"?>
+<?mso-contentType ?>
+<spe:Receivers xmlns:spe="http://schemas.microsoft.com/sharepoint/events">
+  <Receiver>
+    <Name>Document ID Generator</Name>
+    <Synchronization>Synchronous</Synchronization>
+    <Type>10001</Type>
+    <SequenceNumber>1000</SequenceNumber>
+    <Assembly>Microsoft.Office.DocumentManagement, Version=14.0.0.0, Culture=neutral, PublicKeyToken=71e9bce111e9429c</Assembly>
+    <Class>Microsoft.Office.DocumentManagement.Internal.DocIdHandler</Class>
+    <Data/>
+    <Filter/>
+  </Receiver>
+  <Receiver>
+    <Name>Document ID Generator</Name>
+    <Synchronization>Synchronous</Synchronization>
+    <Type>10002</Type>
+    <SequenceNumber>1001</SequenceNumber>
+    <Assembly>Microsoft.Office.DocumentManagement, Version=14.0.0.0, Culture=neutral, PublicKeyToken=71e9bce111e9429c</Assembly>
+    <Class>Microsoft.Office.DocumentManagement.Internal.DocIdHandler</Class>
+    <Data/>
+    <Filter/>
+  </Receiver>
+  <Receiver>
+    <Name>Document ID Generator</Name>
+    <Synchronization>Synchronous</Synchronization>
+    <Type>10004</Type>
+    <SequenceNumber>1002</SequenceNumber>
+    <Assembly>Microsoft.Office.DocumentManagement, Version=14.0.0.0, Culture=neutral, PublicKeyToken=71e9bce111e9429c</Assembly>
+    <Class>Microsoft.Office.DocumentManagement.Internal.DocIdHandler</Class>
+    <Data/>
+    <Filter/>
+  </Receiver>
+  <Receiver>
+    <Name>Document ID Generator</Name>
+    <Synchronization>Synchronous</Synchronization>
+    <Type>10006</Type>
+    <SequenceNumber>1003</SequenceNumber>
+    <Assembly>Microsoft.Office.DocumentManagement, Version=14.0.0.0, Culture=neutral, PublicKeyToken=71e9bce111e9429c</Assembly>
+    <Class>Microsoft.Office.DocumentManagement.Internal.DocIdHandler</Class>
+    <Data/>
+    <Filter/>
+  </Receiver>
+</spe:Receivers>
 </file>
 
-<file path=customXml/itemProps2.xml><?xml version="1.0" encoding="utf-8"?>
-<ds:datastoreItem xmlns:ds="http://schemas.openxmlformats.org/officeDocument/2006/customXml" ds:itemID="{F0EF99C1-AFFA-4072-A3F6-6A9C90E28E63}">
-  <ds:schemaRefs>
-    <ds:schemaRef ds:uri="http://schemas.microsoft.com/office/2006/metadata/customXsn"/>
-  </ds:schemaRefs>
-</ds:datastoreItem>
+<file path=customXml/item4.xml><?xml version="1.0" encoding="utf-8"?>
+<?mso-contentType ?>
+<customXsn xmlns="http://schemas.microsoft.com/office/2006/metadata/customXsn">
+  <xsnLocation/>
+  <cached>True</cached>
+  <openByDefault>True</openByDefault>
+  <xsnScope>/sites/hpc</xsnScope>
+</customXsn>
 </file>
 
-<file path=customXml/itemProps3.xml><?xml version="1.0" encoding="utf-8"?>
-<ds:datastoreItem xmlns:ds="http://schemas.openxmlformats.org/officeDocument/2006/customXml" ds:itemID="{564EE3F2-D13D-4835-816B-74B5A421851B}">
-  <ds:schemaRefs>
-    <ds:schemaRef ds:uri="http://schemas.microsoft.com/sharepoint/v3/contenttype/forms"/>
-  </ds:schemaRefs>
-</ds:datastoreItem>
+<file path=customXml/item5.xml><?xml version="1.0" encoding="utf-8"?>
+<?mso-contentType ?>
+<FormTemplates xmlns="http://schemas.microsoft.com/sharepoint/v3/contenttype/forms">
+  <Display>DocumentLibraryForm</Display>
+  <Edit>DocumentLibraryForm</Edit>
+  <New>DocumentLibraryForm</New>
+</FormTemplates>
 </file>
 
-<file path=customXml/itemProps4.xml><?xml version="1.0" encoding="utf-8"?>
+<file path=customXml/itemProps1.xml><?xml version="1.0" encoding="utf-8"?>
 <ds:datastoreItem xmlns:ds="http://schemas.openxmlformats.org/officeDocument/2006/customXml" ds:itemID="{5D5B35C9-35F5-4278-990B-48710415D639}">
   <ds:schemaRefs>
     <ds:schemaRef ds:uri="http://schemas.microsoft.com/office/2006/metadata/contentType"/>
@@ -12034,7 +12283,7 @@
 </ds:datastoreItem>
 </file>
 
-<file path=customXml/itemProps5.xml><?xml version="1.0" encoding="utf-8"?>
+<file path=customXml/itemProps2.xml><?xml version="1.0" encoding="utf-8"?>
 <ds:datastoreItem xmlns:ds="http://schemas.openxmlformats.org/officeDocument/2006/customXml" ds:itemID="{F0D56244-60B2-41FD-96AD-7AC25F221D7C}">
   <ds:schemaRefs>
     <ds:schemaRef ds:uri="http://schemas.microsoft.com/office/2006/documentManagement/types"/>
@@ -12048,4 +12297,28 @@
     <ds:schemaRef ds:uri="http://www.w3.org/XML/1998/namespace"/>
   </ds:schemaRefs>
 </ds:datastoreItem>
+</file>
+
+<file path=customXml/itemProps3.xml><?xml version="1.0" encoding="utf-8"?>
+<ds:datastoreItem xmlns:ds="http://schemas.openxmlformats.org/officeDocument/2006/customXml" ds:itemID="{7732E273-8A47-4E01-AC36-8FF8A6317757}">
+  <ds:schemaRefs>
+    <ds:schemaRef ds:uri="http://schemas.microsoft.com/sharepoint/events"/>
+  </ds:schemaRefs>
+</ds:datastoreItem>
+</file>
+
+<file path=customXml/itemProps4.xml><?xml version="1.0" encoding="utf-8"?>
+<ds:datastoreItem xmlns:ds="http://schemas.openxmlformats.org/officeDocument/2006/customXml" ds:itemID="{F0EF99C1-AFFA-4072-A3F6-6A9C90E28E63}">
+  <ds:schemaRefs>
+    <ds:schemaRef ds:uri="http://schemas.microsoft.com/office/2006/metadata/customXsn"/>
+  </ds:schemaRefs>
+</ds:datastoreItem>
+</file>
+
+<file path=customXml/itemProps5.xml><?xml version="1.0" encoding="utf-8"?>
+<ds:datastoreItem xmlns:ds="http://schemas.openxmlformats.org/officeDocument/2006/customXml" ds:itemID="{564EE3F2-D13D-4835-816B-74B5A421851B}">
+  <ds:schemaRefs>
+    <ds:schemaRef ds:uri="http://schemas.microsoft.com/sharepoint/v3/contenttype/forms"/>
+  </ds:schemaRefs>
+</ds:datastoreItem>
 </file>
</xml_diff>